<commit_message>
feat: update min weeks, power levels, and docs
</commit_message>
<xml_diff>
--- a/digital-project-manager-2024-q1.pptx
+++ b/digital-project-manager-2024-q1.pptx
@@ -7823,7 +7823,7 @@
           <p:nvPr>
             <p:extLst>
               <p:ext uri="{D42A27DB-BD31-4B8C-83A1-F6EECF244321}">
-                <p14:modId xmlns:p14="http://schemas.microsoft.com/office/powerpoint/2010/main" val="1190319809"/>
+                <p14:modId xmlns:p14="http://schemas.microsoft.com/office/powerpoint/2010/main" val="1855087580"/>
               </p:ext>
             </p:extLst>
           </p:nvPr>
@@ -7946,6 +7946,19 @@
                         </a:rPr>
                       </a:br>
                       <a:r>
+                        <a:rPr lang="en-US" sz="1800" b="0" i="0" u="sng" strike="noStrike" cap="none" dirty="0">
+                          <a:solidFill>
+                            <a:schemeClr val="tx1"/>
+                          </a:solidFill>
+                          <a:effectLst/>
+                          <a:latin typeface="Open Sans Light" panose="020B0306030504020204" pitchFamily="34" charset="0"/>
+                          <a:ea typeface="Open Sans Light" panose="020B0306030504020204" pitchFamily="34" charset="0"/>
+                          <a:cs typeface="Open Sans Light" panose="020B0306030504020204" pitchFamily="34" charset="0"/>
+                          <a:sym typeface="Arial"/>
+                        </a:rPr>
+                        <a:t>Present</a:t>
+                      </a:r>
+                      <a:r>
                         <a:rPr lang="en-US" sz="1800" b="0" i="0" u="none" strike="noStrike" cap="none" dirty="0">
                           <a:solidFill>
                             <a:schemeClr val="tx1"/>
@@ -7956,7 +7969,7 @@
                           <a:cs typeface="Open Sans Light" panose="020B0306030504020204" pitchFamily="34" charset="0"/>
                           <a:sym typeface="Arial"/>
                         </a:rPr>
-                        <a:t>Present value of expected benefit = Future benefit/(1+Discount rate)</a:t>
+                        <a:t> value of expected benefit = Future benefit/(1+Discount rate)</a:t>
                       </a:r>
                       <a:r>
                         <a:rPr lang="en-US" sz="1800" b="0" i="0" u="none" strike="noStrike" cap="none" baseline="50000" dirty="0">
@@ -8463,7 +8476,7 @@
           <p:nvPr>
             <p:extLst>
               <p:ext uri="{D42A27DB-BD31-4B8C-83A1-F6EECF244321}">
-                <p14:modId xmlns:p14="http://schemas.microsoft.com/office/powerpoint/2010/main" val="1266008938"/>
+                <p14:modId xmlns:p14="http://schemas.microsoft.com/office/powerpoint/2010/main" val="1688529619"/>
               </p:ext>
             </p:extLst>
           </p:nvPr>
@@ -8600,7 +8613,20 @@
                           <a:cs typeface="Open Sans Light" panose="020B0306030504020204" pitchFamily="34" charset="0"/>
                           <a:sym typeface="Arial"/>
                         </a:rPr>
-                        <a:t>Minimum: 6 weeks (3 sprint * 2 week/sprint)</a:t>
+                        <a:t>Minimum: </a:t>
+                      </a:r>
+                      <a:r>
+                        <a:rPr lang="en-US" sz="1800" b="0" i="0" u="none" strike="noStrike" cap="none" dirty="0">
+                          <a:solidFill>
+                            <a:schemeClr val="tx1"/>
+                          </a:solidFill>
+                          <a:effectLst/>
+                          <a:latin typeface="Open Sans Light" panose="020B0306030504020204" pitchFamily="34" charset="0"/>
+                          <a:ea typeface="Open Sans Light" panose="020B0306030504020204" pitchFamily="34" charset="0"/>
+                          <a:cs typeface="Open Sans Light" panose="020B0306030504020204" pitchFamily="34" charset="0"/>
+                          <a:sym typeface="Arial"/>
+                        </a:rPr>
+                        <a:t>11 weeks</a:t>
                       </a:r>
                     </a:p>
                     <a:p>
@@ -9425,7 +9451,7 @@
           <p:nvPr>
             <p:extLst>
               <p:ext uri="{D42A27DB-BD31-4B8C-83A1-F6EECF244321}">
-                <p14:modId xmlns:p14="http://schemas.microsoft.com/office/powerpoint/2010/main" val="3850147586"/>
+                <p14:modId xmlns:p14="http://schemas.microsoft.com/office/powerpoint/2010/main" val="4081446157"/>
               </p:ext>
             </p:extLst>
           </p:nvPr>
@@ -12026,15 +12052,15 @@
                         <a:buNone/>
                       </a:pPr>
                       <a:r>
-                        <a:rPr lang="en" b="1" dirty="0">
+                        <a:rPr lang="en-US" b="1" dirty="0">
                           <a:latin typeface="Open Sans"/>
                           <a:ea typeface="Open Sans"/>
                           <a:cs typeface="Open Sans"/>
                           <a:sym typeface="Open Sans"/>
                         </a:rPr>
-                        <a:t>High</a:t>
+                        <a:t>Low</a:t>
                       </a:r>
-                      <a:endParaRPr dirty="0"/>
+                      <a:endParaRPr lang="en-US" dirty="0"/>
                     </a:p>
                   </a:txBody>
                   <a:tcPr marL="91425" marR="91425" marT="91425" marB="91425" anchor="ctr">
@@ -12299,15 +12325,15 @@
                         <a:buNone/>
                       </a:pPr>
                       <a:r>
-                        <a:rPr lang="en" b="1" dirty="0">
+                        <a:rPr lang="en-US" b="1" dirty="0">
                           <a:latin typeface="Open Sans"/>
                           <a:ea typeface="Open Sans"/>
                           <a:cs typeface="Open Sans"/>
                           <a:sym typeface="Open Sans"/>
                         </a:rPr>
-                        <a:t>High</a:t>
+                        <a:t>Low</a:t>
                       </a:r>
-                      <a:endParaRPr dirty="0"/>
+                      <a:endParaRPr lang="en-US" dirty="0"/>
                     </a:p>
                   </a:txBody>
                   <a:tcPr marL="91425" marR="91425" marT="91425" marB="91425" anchor="ctr">
@@ -23522,7 +23548,7 @@
           <p:nvPr>
             <p:extLst>
               <p:ext uri="{D42A27DB-BD31-4B8C-83A1-F6EECF244321}">
-                <p14:modId xmlns:p14="http://schemas.microsoft.com/office/powerpoint/2010/main" val="2267069434"/>
+                <p14:modId xmlns:p14="http://schemas.microsoft.com/office/powerpoint/2010/main" val="1309067294"/>
               </p:ext>
             </p:extLst>
           </p:nvPr>
@@ -23686,7 +23712,7 @@
                           <a:cs typeface="Open Sans Light"/>
                           <a:sym typeface="Open Sans Light"/>
                         </a:rPr>
-                        <a:t>04.06.2024</a:t>
+                        <a:t>10.07.2024</a:t>
                       </a:r>
                       <a:endParaRPr dirty="0">
                         <a:latin typeface="Open Sans Light"/>
@@ -25046,7 +25072,7 @@
           <p:nvPr>
             <p:extLst>
               <p:ext uri="{D42A27DB-BD31-4B8C-83A1-F6EECF244321}">
-                <p14:modId xmlns:p14="http://schemas.microsoft.com/office/powerpoint/2010/main" val="3786354629"/>
+                <p14:modId xmlns:p14="http://schemas.microsoft.com/office/powerpoint/2010/main" val="3358410945"/>
               </p:ext>
             </p:extLst>
           </p:nvPr>
@@ -25151,7 +25177,7 @@
                         <a:buNone/>
                       </a:pPr>
                       <a:r>
-                        <a:rPr lang="en" sz="1200">
+                        <a:rPr lang="en" sz="1200" dirty="0">
                           <a:solidFill>
                             <a:schemeClr val="lt1"/>
                           </a:solidFill>
@@ -25162,7 +25188,7 @@
                         </a:rPr>
                         <a:t>Assignee</a:t>
                       </a:r>
-                      <a:endParaRPr sz="1200">
+                      <a:endParaRPr sz="1200" dirty="0">
                         <a:solidFill>
                           <a:schemeClr val="lt1"/>
                         </a:solidFill>
@@ -25291,9 +25317,9 @@
                           <a:solidFill>
                             <a:schemeClr val="dk1"/>
                           </a:solidFill>
-                          <a:latin typeface="Open Sans"/>
-                          <a:ea typeface="Open Sans"/>
-                          <a:cs typeface="Open Sans"/>
+                          <a:latin typeface="Open Sans" panose="020B0606030504020204" pitchFamily="34" charset="0"/>
+                          <a:ea typeface="Open Sans" panose="020B0606030504020204" pitchFamily="34" charset="0"/>
+                          <a:cs typeface="Open Sans" panose="020B0606030504020204" pitchFamily="34" charset="0"/>
                           <a:sym typeface="Open Sans"/>
                         </a:rPr>
                         <a:t>Storefront Technical Documentation</a:t>
@@ -25302,9 +25328,9 @@
                         <a:solidFill>
                           <a:schemeClr val="dk1"/>
                         </a:solidFill>
-                        <a:latin typeface="Open Sans"/>
-                        <a:ea typeface="Open Sans"/>
-                        <a:cs typeface="Open Sans"/>
+                        <a:latin typeface="Open Sans" panose="020B0606030504020204" pitchFamily="34" charset="0"/>
+                        <a:ea typeface="Open Sans" panose="020B0606030504020204" pitchFamily="34" charset="0"/>
+                        <a:cs typeface="Open Sans" panose="020B0606030504020204" pitchFamily="34" charset="0"/>
                         <a:sym typeface="Open Sans"/>
                       </a:endParaRPr>
                     </a:p>
@@ -25330,9 +25356,9 @@
                           <a:solidFill>
                             <a:schemeClr val="dk1"/>
                           </a:solidFill>
-                          <a:latin typeface="Open Sans"/>
-                          <a:ea typeface="Open Sans"/>
-                          <a:cs typeface="Open Sans"/>
+                          <a:latin typeface="Open Sans" panose="020B0606030504020204" pitchFamily="34" charset="0"/>
+                          <a:ea typeface="Open Sans" panose="020B0606030504020204" pitchFamily="34" charset="0"/>
+                          <a:cs typeface="Open Sans" panose="020B0606030504020204" pitchFamily="34" charset="0"/>
                           <a:sym typeface="Open Sans"/>
                         </a:rPr>
                         <a:t>Aliyah</a:t>
@@ -25341,9 +25367,9 @@
                         <a:solidFill>
                           <a:schemeClr val="dk1"/>
                         </a:solidFill>
-                        <a:latin typeface="Open Sans"/>
-                        <a:ea typeface="Open Sans"/>
-                        <a:cs typeface="Open Sans"/>
+                        <a:latin typeface="Open Sans" panose="020B0606030504020204" pitchFamily="34" charset="0"/>
+                        <a:ea typeface="Open Sans" panose="020B0606030504020204" pitchFamily="34" charset="0"/>
+                        <a:cs typeface="Open Sans" panose="020B0606030504020204" pitchFamily="34" charset="0"/>
                         <a:sym typeface="Open Sans"/>
                       </a:endParaRPr>
                     </a:p>
@@ -25369,9 +25395,9 @@
                           <a:solidFill>
                             <a:schemeClr val="dk1"/>
                           </a:solidFill>
-                          <a:latin typeface="Open Sans"/>
-                          <a:ea typeface="Open Sans"/>
-                          <a:cs typeface="Open Sans"/>
+                          <a:latin typeface="Open Sans" panose="020B0606030504020204" pitchFamily="34" charset="0"/>
+                          <a:ea typeface="Open Sans" panose="020B0606030504020204" pitchFamily="34" charset="0"/>
+                          <a:cs typeface="Open Sans" panose="020B0606030504020204" pitchFamily="34" charset="0"/>
                           <a:sym typeface="Open Sans"/>
                         </a:rPr>
                         <a:t>After finishing Build Storefront task</a:t>
@@ -25380,9 +25406,9 @@
                         <a:solidFill>
                           <a:schemeClr val="dk1"/>
                         </a:solidFill>
-                        <a:latin typeface="Open Sans"/>
-                        <a:ea typeface="Open Sans"/>
-                        <a:cs typeface="Open Sans"/>
+                        <a:latin typeface="Open Sans" panose="020B0606030504020204" pitchFamily="34" charset="0"/>
+                        <a:ea typeface="Open Sans" panose="020B0606030504020204" pitchFamily="34" charset="0"/>
+                        <a:cs typeface="Open Sans" panose="020B0606030504020204" pitchFamily="34" charset="0"/>
                         <a:sym typeface="Open Sans"/>
                       </a:endParaRPr>
                     </a:p>
@@ -25409,20 +25435,20 @@
                             <a:srgbClr val="000000"/>
                           </a:solidFill>
                           <a:effectLst/>
-                          <a:latin typeface="Open Sans Light" panose="020B0306030504020204" pitchFamily="34" charset="0"/>
-                          <a:ea typeface="Open Sans Light" panose="020B0306030504020204" pitchFamily="34" charset="0"/>
-                          <a:cs typeface="Open Sans Light" panose="020B0306030504020204" pitchFamily="34" charset="0"/>
+                          <a:latin typeface="Open Sans" panose="020B0606030504020204" pitchFamily="34" charset="0"/>
+                          <a:ea typeface="Open Sans" panose="020B0606030504020204" pitchFamily="34" charset="0"/>
+                          <a:cs typeface="Open Sans" panose="020B0606030504020204" pitchFamily="34" charset="0"/>
                           <a:sym typeface="Arial"/>
                         </a:rPr>
                         <a:t>To ensure technical details are documented for maintenance purposes</a:t>
                       </a:r>
-                      <a:endParaRPr sz="1100" dirty="0">
+                      <a:endParaRPr sz="1200" dirty="0">
                         <a:solidFill>
                           <a:schemeClr val="dk1"/>
                         </a:solidFill>
-                        <a:latin typeface="Open Sans Light" panose="020B0306030504020204" pitchFamily="34" charset="0"/>
-                        <a:ea typeface="Open Sans Light" panose="020B0306030504020204" pitchFamily="34" charset="0"/>
-                        <a:cs typeface="Open Sans Light" panose="020B0306030504020204" pitchFamily="34" charset="0"/>
+                        <a:latin typeface="Open Sans" panose="020B0606030504020204" pitchFamily="34" charset="0"/>
+                        <a:ea typeface="Open Sans" panose="020B0606030504020204" pitchFamily="34" charset="0"/>
+                        <a:cs typeface="Open Sans" panose="020B0606030504020204" pitchFamily="34" charset="0"/>
                         <a:sym typeface="Open Sans"/>
                       </a:endParaRPr>
                     </a:p>
@@ -25456,24 +25482,24 @@
                         <a:buNone/>
                       </a:pPr>
                       <a:r>
-                        <a:rPr lang="en" sz="1200">
+                        <a:rPr lang="en" sz="1200" dirty="0">
                           <a:solidFill>
                             <a:schemeClr val="dk1"/>
                           </a:solidFill>
-                          <a:latin typeface="Open Sans"/>
-                          <a:ea typeface="Open Sans"/>
-                          <a:cs typeface="Open Sans"/>
+                          <a:latin typeface="Open Sans" panose="020B0606030504020204" pitchFamily="34" charset="0"/>
+                          <a:ea typeface="Open Sans" panose="020B0606030504020204" pitchFamily="34" charset="0"/>
+                          <a:cs typeface="Open Sans" panose="020B0606030504020204" pitchFamily="34" charset="0"/>
                           <a:sym typeface="Open Sans"/>
                         </a:rPr>
                         <a:t>Platform user’s manual</a:t>
                       </a:r>
-                      <a:endParaRPr sz="1200">
+                      <a:endParaRPr sz="1200" dirty="0">
                         <a:solidFill>
                           <a:schemeClr val="dk1"/>
                         </a:solidFill>
-                        <a:latin typeface="Open Sans"/>
-                        <a:ea typeface="Open Sans"/>
-                        <a:cs typeface="Open Sans"/>
+                        <a:latin typeface="Open Sans" panose="020B0606030504020204" pitchFamily="34" charset="0"/>
+                        <a:ea typeface="Open Sans" panose="020B0606030504020204" pitchFamily="34" charset="0"/>
+                        <a:cs typeface="Open Sans" panose="020B0606030504020204" pitchFamily="34" charset="0"/>
                         <a:sym typeface="Open Sans"/>
                       </a:endParaRPr>
                     </a:p>
@@ -25492,28 +25518,62 @@
                         <a:spcAft>
                           <a:spcPts val="0"/>
                         </a:spcAft>
+                        <a:buClr>
+                          <a:schemeClr val="dk1"/>
+                        </a:buClr>
+                        <a:buSzPts val="1100"/>
+                        <a:buFont typeface="Arial"/>
                         <a:buNone/>
                       </a:pPr>
                       <a:r>
-                        <a:rPr lang="en-US" sz="1200" b="0" i="0" u="none" strike="noStrike" cap="none" dirty="0">
+                        <a:rPr lang="en-US" sz="1200" dirty="0">
                           <a:solidFill>
-                            <a:srgbClr val="000000"/>
+                            <a:schemeClr val="dk1"/>
                           </a:solidFill>
-                          <a:effectLst/>
-                          <a:latin typeface="Arial"/>
-                          <a:ea typeface="Arial"/>
-                          <a:cs typeface="Arial"/>
-                          <a:sym typeface="Arial"/>
+                          <a:latin typeface="Open Sans" panose="020B0606030504020204" pitchFamily="34" charset="0"/>
+                          <a:ea typeface="Open Sans" panose="020B0606030504020204" pitchFamily="34" charset="0"/>
+                          <a:cs typeface="Open Sans" panose="020B0606030504020204" pitchFamily="34" charset="0"/>
+                          <a:sym typeface="Open Sans"/>
                         </a:rPr>
-                        <a:t>Aliyah</a:t>
+                        <a:t>Moe</a:t>
                       </a:r>
-                      <a:endParaRPr sz="1100" dirty="0">
+                    </a:p>
+                  </a:txBody>
+                  <a:tcPr marL="91425" marR="91425" marT="91425" marB="91425" anchor="ctr"/>
+                </a:tc>
+                <a:tc>
+                  <a:txBody>
+                    <a:bodyPr/>
+                    <a:lstStyle/>
+                    <a:p>
+                      <a:pPr marL="0" lvl="0" indent="0" algn="ctr" rtl="0">
+                        <a:spcBef>
+                          <a:spcPts val="0"/>
+                        </a:spcBef>
+                        <a:spcAft>
+                          <a:spcPts val="0"/>
+                        </a:spcAft>
+                        <a:buNone/>
+                      </a:pPr>
+                      <a:r>
+                        <a:rPr lang="en" sz="1200" dirty="0">
+                          <a:solidFill>
+                            <a:schemeClr val="dk1"/>
+                          </a:solidFill>
+                          <a:latin typeface="Open Sans" panose="020B0606030504020204" pitchFamily="34" charset="0"/>
+                          <a:ea typeface="Open Sans" panose="020B0606030504020204" pitchFamily="34" charset="0"/>
+                          <a:cs typeface="Open Sans" panose="020B0606030504020204" pitchFamily="34" charset="0"/>
+                          <a:sym typeface="Open Sans"/>
+                        </a:rPr>
+                        <a:t>Before the training the Stefanos</a:t>
+                      </a:r>
+                      <a:endParaRPr sz="1200" dirty="0">
                         <a:solidFill>
                           <a:schemeClr val="dk1"/>
                         </a:solidFill>
-                        <a:latin typeface="Open Sans"/>
-                        <a:ea typeface="Open Sans"/>
-                        <a:cs typeface="Open Sans"/>
+                        <a:latin typeface="Open Sans" panose="020B0606030504020204" pitchFamily="34" charset="0"/>
+                        <a:ea typeface="Open Sans" panose="020B0606030504020204" pitchFamily="34" charset="0"/>
+                        <a:cs typeface="Open Sans" panose="020B0606030504020204" pitchFamily="34" charset="0"/>
                         <a:sym typeface="Open Sans"/>
                       </a:endParaRPr>
                     </a:p>
@@ -25532,45 +25592,6 @@
                         <a:spcAft>
                           <a:spcPts val="0"/>
                         </a:spcAft>
-                        <a:buNone/>
-                      </a:pPr>
-                      <a:r>
-                        <a:rPr lang="en" sz="1200" dirty="0">
-                          <a:solidFill>
-                            <a:schemeClr val="dk1"/>
-                          </a:solidFill>
-                          <a:latin typeface="Open Sans"/>
-                          <a:ea typeface="Open Sans"/>
-                          <a:cs typeface="Open Sans"/>
-                          <a:sym typeface="Open Sans"/>
-                        </a:rPr>
-                        <a:t>Before the training the Stefanos</a:t>
-                      </a:r>
-                      <a:endParaRPr sz="1200" dirty="0">
-                        <a:solidFill>
-                          <a:schemeClr val="dk1"/>
-                        </a:solidFill>
-                        <a:latin typeface="Open Sans"/>
-                        <a:ea typeface="Open Sans"/>
-                        <a:cs typeface="Open Sans"/>
-                        <a:sym typeface="Open Sans"/>
-                      </a:endParaRPr>
-                    </a:p>
-                  </a:txBody>
-                  <a:tcPr marL="91425" marR="91425" marT="91425" marB="91425" anchor="ctr"/>
-                </a:tc>
-                <a:tc>
-                  <a:txBody>
-                    <a:bodyPr/>
-                    <a:lstStyle/>
-                    <a:p>
-                      <a:pPr marL="0" lvl="0" indent="0" algn="ctr" rtl="0">
-                        <a:spcBef>
-                          <a:spcPts val="0"/>
-                        </a:spcBef>
-                        <a:spcAft>
-                          <a:spcPts val="0"/>
-                        </a:spcAft>
                         <a:buClr>
                           <a:schemeClr val="dk1"/>
                         </a:buClr>
@@ -25583,9 +25604,9 @@
                           <a:solidFill>
                             <a:schemeClr val="dk1"/>
                           </a:solidFill>
-                          <a:latin typeface="Open Sans"/>
-                          <a:ea typeface="Open Sans"/>
-                          <a:cs typeface="Open Sans"/>
+                          <a:latin typeface="Open Sans" panose="020B0606030504020204" pitchFamily="34" charset="0"/>
+                          <a:ea typeface="Open Sans" panose="020B0606030504020204" pitchFamily="34" charset="0"/>
+                          <a:cs typeface="Open Sans" panose="020B0606030504020204" pitchFamily="34" charset="0"/>
                           <a:sym typeface="Open Sans"/>
                         </a:rPr>
                         <a:t>A documentation that can be given to Stefanos as a manual</a:t>
@@ -25594,9 +25615,9 @@
                         <a:solidFill>
                           <a:schemeClr val="dk1"/>
                         </a:solidFill>
-                        <a:latin typeface="Open Sans"/>
-                        <a:ea typeface="Open Sans"/>
-                        <a:cs typeface="Open Sans"/>
+                        <a:latin typeface="Open Sans" panose="020B0606030504020204" pitchFamily="34" charset="0"/>
+                        <a:ea typeface="Open Sans" panose="020B0606030504020204" pitchFamily="34" charset="0"/>
+                        <a:cs typeface="Open Sans" panose="020B0606030504020204" pitchFamily="34" charset="0"/>
                         <a:sym typeface="Open Sans"/>
                       </a:endParaRPr>
                     </a:p>
@@ -25629,98 +25650,14 @@
                           <a:solidFill>
                             <a:schemeClr val="dk1"/>
                           </a:solidFill>
-                          <a:latin typeface="Open Sans"/>
-                          <a:ea typeface="Open Sans"/>
-                          <a:cs typeface="Open Sans"/>
+                          <a:latin typeface="Open Sans" panose="020B0606030504020204" pitchFamily="34" charset="0"/>
+                          <a:ea typeface="Open Sans" panose="020B0606030504020204" pitchFamily="34" charset="0"/>
+                          <a:cs typeface="Open Sans" panose="020B0606030504020204" pitchFamily="34" charset="0"/>
                           <a:sym typeface="Open Sans"/>
                         </a:rPr>
                         <a:t>Recommendation Engine Documentation</a:t>
                       </a:r>
                       <a:endParaRPr sz="1200">
-                        <a:solidFill>
-                          <a:schemeClr val="dk1"/>
-                        </a:solidFill>
-                        <a:latin typeface="Open Sans"/>
-                        <a:ea typeface="Open Sans"/>
-                        <a:cs typeface="Open Sans"/>
-                        <a:sym typeface="Open Sans"/>
-                      </a:endParaRPr>
-                    </a:p>
-                  </a:txBody>
-                  <a:tcPr marL="91425" marR="91425" marT="91425" marB="91425" anchor="ctr"/>
-                </a:tc>
-                <a:tc>
-                  <a:txBody>
-                    <a:bodyPr/>
-                    <a:lstStyle/>
-                    <a:p>
-                      <a:pPr marL="0" lvl="0" indent="0" algn="ctr" rtl="0">
-                        <a:spcBef>
-                          <a:spcPts val="0"/>
-                        </a:spcBef>
-                        <a:spcAft>
-                          <a:spcPts val="0"/>
-                        </a:spcAft>
-                        <a:buClr>
-                          <a:schemeClr val="dk1"/>
-                        </a:buClr>
-                        <a:buSzPts val="1100"/>
-                        <a:buFont typeface="Arial"/>
-                        <a:buNone/>
-                      </a:pPr>
-                      <a:r>
-                        <a:rPr lang="en" sz="1200" dirty="0">
-                          <a:solidFill>
-                            <a:schemeClr val="dk1"/>
-                          </a:solidFill>
-                          <a:latin typeface="Open Sans"/>
-                          <a:ea typeface="Open Sans"/>
-                          <a:cs typeface="Open Sans"/>
-                          <a:sym typeface="Open Sans"/>
-                        </a:rPr>
-                        <a:t>Aliyah</a:t>
-                      </a:r>
-                      <a:endParaRPr sz="1200" dirty="0">
-                        <a:solidFill>
-                          <a:schemeClr val="dk1"/>
-                        </a:solidFill>
-                        <a:latin typeface="Open Sans"/>
-                        <a:ea typeface="Open Sans"/>
-                        <a:cs typeface="Open Sans"/>
-                        <a:sym typeface="Open Sans"/>
-                      </a:endParaRPr>
-                    </a:p>
-                  </a:txBody>
-                  <a:tcPr marL="91425" marR="91425" marT="91425" marB="91425" anchor="ctr"/>
-                </a:tc>
-                <a:tc>
-                  <a:txBody>
-                    <a:bodyPr/>
-                    <a:lstStyle/>
-                    <a:p>
-                      <a:pPr marL="0" lvl="0" indent="0" algn="ctr" rtl="0">
-                        <a:spcBef>
-                          <a:spcPts val="0"/>
-                        </a:spcBef>
-                        <a:spcAft>
-                          <a:spcPts val="0"/>
-                        </a:spcAft>
-                        <a:buNone/>
-                      </a:pPr>
-                      <a:r>
-                        <a:rPr lang="en-US" sz="1200" b="0" i="0" u="none" strike="noStrike" cap="none" dirty="0">
-                          <a:solidFill>
-                            <a:srgbClr val="000000"/>
-                          </a:solidFill>
-                          <a:effectLst/>
-                          <a:latin typeface="Open Sans" panose="020B0606030504020204" pitchFamily="34" charset="0"/>
-                          <a:ea typeface="Open Sans" panose="020B0606030504020204" pitchFamily="34" charset="0"/>
-                          <a:cs typeface="Open Sans" panose="020B0606030504020204" pitchFamily="34" charset="0"/>
-                          <a:sym typeface="Arial"/>
-                        </a:rPr>
-                        <a:t>After finishing recommendation engine task</a:t>
-                      </a:r>
-                      <a:endParaRPr sz="1100" dirty="0">
                         <a:solidFill>
                           <a:schemeClr val="dk1"/>
                         </a:solidFill>
@@ -25745,6 +25682,11 @@
                         <a:spcAft>
                           <a:spcPts val="0"/>
                         </a:spcAft>
+                        <a:buClr>
+                          <a:schemeClr val="dk1"/>
+                        </a:buClr>
+                        <a:buSzPts val="1100"/>
+                        <a:buFont typeface="Arial"/>
                         <a:buNone/>
                       </a:pPr>
                       <a:r>
@@ -25752,9 +25694,88 @@
                           <a:solidFill>
                             <a:schemeClr val="dk1"/>
                           </a:solidFill>
-                          <a:latin typeface="Open Sans"/>
-                          <a:ea typeface="Open Sans"/>
-                          <a:cs typeface="Open Sans"/>
+                          <a:latin typeface="Open Sans" panose="020B0606030504020204" pitchFamily="34" charset="0"/>
+                          <a:ea typeface="Open Sans" panose="020B0606030504020204" pitchFamily="34" charset="0"/>
+                          <a:cs typeface="Open Sans" panose="020B0606030504020204" pitchFamily="34" charset="0"/>
+                          <a:sym typeface="Open Sans"/>
+                        </a:rPr>
+                        <a:t>Aliyah</a:t>
+                      </a:r>
+                      <a:endParaRPr sz="1200" dirty="0">
+                        <a:solidFill>
+                          <a:schemeClr val="dk1"/>
+                        </a:solidFill>
+                        <a:latin typeface="Open Sans" panose="020B0606030504020204" pitchFamily="34" charset="0"/>
+                        <a:ea typeface="Open Sans" panose="020B0606030504020204" pitchFamily="34" charset="0"/>
+                        <a:cs typeface="Open Sans" panose="020B0606030504020204" pitchFamily="34" charset="0"/>
+                        <a:sym typeface="Open Sans"/>
+                      </a:endParaRPr>
+                    </a:p>
+                  </a:txBody>
+                  <a:tcPr marL="91425" marR="91425" marT="91425" marB="91425" anchor="ctr"/>
+                </a:tc>
+                <a:tc>
+                  <a:txBody>
+                    <a:bodyPr/>
+                    <a:lstStyle/>
+                    <a:p>
+                      <a:pPr marL="0" lvl="0" indent="0" algn="ctr" rtl="0">
+                        <a:spcBef>
+                          <a:spcPts val="0"/>
+                        </a:spcBef>
+                        <a:spcAft>
+                          <a:spcPts val="0"/>
+                        </a:spcAft>
+                        <a:buNone/>
+                      </a:pPr>
+                      <a:r>
+                        <a:rPr lang="en-US" sz="1200" b="0" i="0" u="none" strike="noStrike" cap="none" dirty="0">
+                          <a:solidFill>
+                            <a:srgbClr val="000000"/>
+                          </a:solidFill>
+                          <a:effectLst/>
+                          <a:latin typeface="Open Sans" panose="020B0606030504020204" pitchFamily="34" charset="0"/>
+                          <a:ea typeface="Open Sans" panose="020B0606030504020204" pitchFamily="34" charset="0"/>
+                          <a:cs typeface="Open Sans" panose="020B0606030504020204" pitchFamily="34" charset="0"/>
+                          <a:sym typeface="Arial"/>
+                        </a:rPr>
+                        <a:t>After finishing recommendation engine task</a:t>
+                      </a:r>
+                      <a:endParaRPr sz="1200" dirty="0">
+                        <a:solidFill>
+                          <a:schemeClr val="dk1"/>
+                        </a:solidFill>
+                        <a:latin typeface="Open Sans" panose="020B0606030504020204" pitchFamily="34" charset="0"/>
+                        <a:ea typeface="Open Sans" panose="020B0606030504020204" pitchFamily="34" charset="0"/>
+                        <a:cs typeface="Open Sans" panose="020B0606030504020204" pitchFamily="34" charset="0"/>
+                        <a:sym typeface="Open Sans"/>
+                      </a:endParaRPr>
+                    </a:p>
+                  </a:txBody>
+                  <a:tcPr marL="91425" marR="91425" marT="91425" marB="91425" anchor="ctr"/>
+                </a:tc>
+                <a:tc>
+                  <a:txBody>
+                    <a:bodyPr/>
+                    <a:lstStyle/>
+                    <a:p>
+                      <a:pPr marL="0" lvl="0" indent="0" algn="ctr" rtl="0">
+                        <a:spcBef>
+                          <a:spcPts val="0"/>
+                        </a:spcBef>
+                        <a:spcAft>
+                          <a:spcPts val="0"/>
+                        </a:spcAft>
+                        <a:buNone/>
+                      </a:pPr>
+                      <a:r>
+                        <a:rPr lang="en" sz="1200" dirty="0">
+                          <a:solidFill>
+                            <a:schemeClr val="dk1"/>
+                          </a:solidFill>
+                          <a:latin typeface="Open Sans" panose="020B0606030504020204" pitchFamily="34" charset="0"/>
+                          <a:ea typeface="Open Sans" panose="020B0606030504020204" pitchFamily="34" charset="0"/>
+                          <a:cs typeface="Open Sans" panose="020B0606030504020204" pitchFamily="34" charset="0"/>
                           <a:sym typeface="Open Sans"/>
                         </a:rPr>
                         <a:t>A comprehensive guide for the  end-users and maintenance teams</a:t>
@@ -25763,9 +25784,9 @@
                         <a:solidFill>
                           <a:schemeClr val="dk1"/>
                         </a:solidFill>
-                        <a:latin typeface="Open Sans"/>
-                        <a:ea typeface="Open Sans"/>
-                        <a:cs typeface="Open Sans"/>
+                        <a:latin typeface="Open Sans" panose="020B0606030504020204" pitchFamily="34" charset="0"/>
+                        <a:ea typeface="Open Sans" panose="020B0606030504020204" pitchFamily="34" charset="0"/>
+                        <a:cs typeface="Open Sans" panose="020B0606030504020204" pitchFamily="34" charset="0"/>
                         <a:sym typeface="Open Sans"/>
                       </a:endParaRPr>
                     </a:p>
@@ -25798,9 +25819,9 @@
                           <a:solidFill>
                             <a:schemeClr val="dk1"/>
                           </a:solidFill>
-                          <a:latin typeface="Open Sans"/>
-                          <a:ea typeface="Open Sans"/>
-                          <a:cs typeface="Open Sans"/>
+                          <a:latin typeface="Open Sans" panose="020B0606030504020204" pitchFamily="34" charset="0"/>
+                          <a:ea typeface="Open Sans" panose="020B0606030504020204" pitchFamily="34" charset="0"/>
+                          <a:cs typeface="Open Sans" panose="020B0606030504020204" pitchFamily="34" charset="0"/>
                           <a:sym typeface="Open Sans"/>
                         </a:rPr>
                         <a:t>Lesson Learned Document</a:t>
@@ -25809,9 +25830,9 @@
                         <a:solidFill>
                           <a:schemeClr val="dk1"/>
                         </a:solidFill>
-                        <a:latin typeface="Open Sans"/>
-                        <a:ea typeface="Open Sans"/>
-                        <a:cs typeface="Open Sans"/>
+                        <a:latin typeface="Open Sans" panose="020B0606030504020204" pitchFamily="34" charset="0"/>
+                        <a:ea typeface="Open Sans" panose="020B0606030504020204" pitchFamily="34" charset="0"/>
+                        <a:cs typeface="Open Sans" panose="020B0606030504020204" pitchFamily="34" charset="0"/>
                         <a:sym typeface="Open Sans"/>
                       </a:endParaRPr>
                     </a:p>
@@ -25837,9 +25858,9 @@
                           <a:solidFill>
                             <a:schemeClr val="dk1"/>
                           </a:solidFill>
-                          <a:latin typeface="Open Sans"/>
-                          <a:ea typeface="Open Sans"/>
-                          <a:cs typeface="Open Sans"/>
+                          <a:latin typeface="Open Sans" panose="020B0606030504020204" pitchFamily="34" charset="0"/>
+                          <a:ea typeface="Open Sans" panose="020B0606030504020204" pitchFamily="34" charset="0"/>
+                          <a:cs typeface="Open Sans" panose="020B0606030504020204" pitchFamily="34" charset="0"/>
                           <a:sym typeface="Open Sans"/>
                         </a:rPr>
                         <a:t>Project Manager</a:t>
@@ -25848,9 +25869,9 @@
                         <a:solidFill>
                           <a:schemeClr val="dk1"/>
                         </a:solidFill>
-                        <a:latin typeface="Open Sans"/>
-                        <a:ea typeface="Open Sans"/>
-                        <a:cs typeface="Open Sans"/>
+                        <a:latin typeface="Open Sans" panose="020B0606030504020204" pitchFamily="34" charset="0"/>
+                        <a:ea typeface="Open Sans" panose="020B0606030504020204" pitchFamily="34" charset="0"/>
+                        <a:cs typeface="Open Sans" panose="020B0606030504020204" pitchFamily="34" charset="0"/>
                         <a:sym typeface="Open Sans"/>
                       </a:endParaRPr>
                     </a:p>
@@ -25876,9 +25897,9 @@
                           <a:solidFill>
                             <a:schemeClr val="dk1"/>
                           </a:solidFill>
-                          <a:latin typeface="Open Sans"/>
-                          <a:ea typeface="Open Sans"/>
-                          <a:cs typeface="Open Sans"/>
+                          <a:latin typeface="Open Sans" panose="020B0606030504020204" pitchFamily="34" charset="0"/>
+                          <a:ea typeface="Open Sans" panose="020B0606030504020204" pitchFamily="34" charset="0"/>
+                          <a:cs typeface="Open Sans" panose="020B0606030504020204" pitchFamily="34" charset="0"/>
                           <a:sym typeface="Open Sans"/>
                         </a:rPr>
                         <a:t>After the project is finished</a:t>
@@ -25887,9 +25908,9 @@
                         <a:solidFill>
                           <a:schemeClr val="dk1"/>
                         </a:solidFill>
-                        <a:latin typeface="Open Sans"/>
-                        <a:ea typeface="Open Sans"/>
-                        <a:cs typeface="Open Sans"/>
+                        <a:latin typeface="Open Sans" panose="020B0606030504020204" pitchFamily="34" charset="0"/>
+                        <a:ea typeface="Open Sans" panose="020B0606030504020204" pitchFamily="34" charset="0"/>
+                        <a:cs typeface="Open Sans" panose="020B0606030504020204" pitchFamily="34" charset="0"/>
                         <a:sym typeface="Open Sans"/>
                       </a:endParaRPr>
                     </a:p>

</xml_diff>